<commit_message>
Stable release 1.8 FINAL_FINAL_FINAL
</commit_message>
<xml_diff>
--- a/Ecosystem approach to Opioid Crisis.pptx
+++ b/Ecosystem approach to Opioid Crisis.pptx
@@ -7,16 +7,14 @@
   <p:sldIdLst>
     <p:sldId id="256" r:id="rId2"/>
     <p:sldId id="257" r:id="rId3"/>
-    <p:sldId id="266" r:id="rId4"/>
-    <p:sldId id="261" r:id="rId5"/>
-    <p:sldId id="265" r:id="rId6"/>
-    <p:sldId id="258" r:id="rId7"/>
-    <p:sldId id="259" r:id="rId8"/>
-    <p:sldId id="260" r:id="rId9"/>
-    <p:sldId id="262" r:id="rId10"/>
-    <p:sldId id="263" r:id="rId11"/>
-    <p:sldId id="264" r:id="rId12"/>
-    <p:sldId id="267" r:id="rId13"/>
+    <p:sldId id="261" r:id="rId4"/>
+    <p:sldId id="265" r:id="rId5"/>
+    <p:sldId id="258" r:id="rId6"/>
+    <p:sldId id="259" r:id="rId7"/>
+    <p:sldId id="260" r:id="rId8"/>
+    <p:sldId id="262" r:id="rId9"/>
+    <p:sldId id="263" r:id="rId10"/>
+    <p:sldId id="264" r:id="rId11"/>
   </p:sldIdLst>
   <p:sldSz cx="12192000" cy="6858000"/>
   <p:notesSz cx="6858000" cy="9144000"/>
@@ -7787,97 +7785,6 @@
         </p:nvSpPr>
         <p:spPr>
           <a:xfrm>
-            <a:off x="2377177" y="490329"/>
-            <a:ext cx="8915400" cy="5950227"/>
-          </a:xfrm>
-        </p:spPr>
-        <p:txBody>
-          <a:bodyPr>
-            <a:normAutofit/>
-          </a:bodyPr>
-          <a:lstStyle/>
-          <a:p>
-            <a:r>
-              <a:rPr lang="en-IN" sz="2800" dirty="0">
-                <a:latin typeface="Segoe UI" panose="020B0502040204020203" pitchFamily="34" charset="0"/>
-                <a:cs typeface="Segoe UI" panose="020B0502040204020203" pitchFamily="34" charset="0"/>
-              </a:rPr>
-              <a:t>Stakeholders</a:t>
-            </a:r>
-          </a:p>
-          <a:p>
-            <a:endParaRPr lang="en-IN" sz="2800" dirty="0"/>
-          </a:p>
-          <a:p>
-            <a:r>
-              <a:rPr lang="en-IN" sz="2800" dirty="0"/>
-              <a:t>5. </a:t>
-            </a:r>
-            <a:r>
-              <a:rPr lang="en-IN" sz="2400" dirty="0">
-                <a:latin typeface="Segoe UI" panose="020B0502040204020203" pitchFamily="34" charset="0"/>
-                <a:cs typeface="Segoe UI" panose="020B0502040204020203" pitchFamily="34" charset="0"/>
-              </a:rPr>
-              <a:t>Public Health Organization (Ecosystem)</a:t>
-            </a:r>
-          </a:p>
-          <a:p>
-            <a:endParaRPr lang="en-IN" sz="2400" dirty="0"/>
-          </a:p>
-          <a:p>
-            <a:r>
-              <a:rPr lang="en-US" dirty="0"/>
-              <a:t>Collaborate with other organizations to find patients who are abusing opioids</a:t>
-            </a:r>
-            <a:endParaRPr lang="en-IN" dirty="0"/>
-          </a:p>
-          <a:p>
-            <a:endParaRPr lang="en-IN" sz="2800" dirty="0"/>
-          </a:p>
-        </p:txBody>
-      </p:sp>
-    </p:spTree>
-    <p:extLst>
-      <p:ext uri="{BB962C8B-B14F-4D97-AF65-F5344CB8AC3E}">
-        <p14:creationId xmlns:p14="http://schemas.microsoft.com/office/powerpoint/2010/main" val="4038624650"/>
-      </p:ext>
-    </p:extLst>
-  </p:cSld>
-  <p:clrMapOvr>
-    <a:masterClrMapping/>
-  </p:clrMapOvr>
-</p:sld>
-</file>
-
-<file path=ppt/slides/slide11.xml><?xml version="1.0" encoding="utf-8"?>
-<p:sld xmlns:a="http://schemas.openxmlformats.org/drawingml/2006/main" xmlns:r="http://schemas.openxmlformats.org/officeDocument/2006/relationships" xmlns:p="http://schemas.openxmlformats.org/presentationml/2006/main">
-  <p:cSld>
-    <p:spTree>
-      <p:nvGrpSpPr>
-        <p:cNvPr id="1" name=""/>
-        <p:cNvGrpSpPr/>
-        <p:nvPr/>
-      </p:nvGrpSpPr>
-      <p:grpSpPr>
-        <a:xfrm>
-          <a:off x="0" y="0"/>
-          <a:ext cx="0" cy="0"/>
-          <a:chOff x="0" y="0"/>
-          <a:chExt cx="0" cy="0"/>
-        </a:xfrm>
-      </p:grpSpPr>
-      <p:sp>
-        <p:nvSpPr>
-          <p:cNvPr id="3" name="Content Placeholder 2"/>
-          <p:cNvSpPr>
-            <a:spLocks noGrp="1"/>
-          </p:cNvSpPr>
-          <p:nvPr>
-            <p:ph idx="1"/>
-          </p:nvPr>
-        </p:nvSpPr>
-        <p:spPr>
-          <a:xfrm>
             <a:off x="2628968" y="503583"/>
             <a:ext cx="8915400" cy="5976730"/>
           </a:xfrm>
@@ -7922,36 +7829,6 @@
     <p:extLst>
       <p:ext uri="{BB962C8B-B14F-4D97-AF65-F5344CB8AC3E}">
         <p14:creationId xmlns:p14="http://schemas.microsoft.com/office/powerpoint/2010/main" val="2252608872"/>
-      </p:ext>
-    </p:extLst>
-  </p:cSld>
-  <p:clrMapOvr>
-    <a:masterClrMapping/>
-  </p:clrMapOvr>
-</p:sld>
-</file>
-
-<file path=ppt/slides/slide12.xml><?xml version="1.0" encoding="utf-8"?>
-<p:sld xmlns:a="http://schemas.openxmlformats.org/drawingml/2006/main" xmlns:r="http://schemas.openxmlformats.org/officeDocument/2006/relationships" xmlns:p="http://schemas.openxmlformats.org/presentationml/2006/main">
-  <p:cSld>
-    <p:spTree>
-      <p:nvGrpSpPr>
-        <p:cNvPr id="1" name=""/>
-        <p:cNvGrpSpPr/>
-        <p:nvPr/>
-      </p:nvGrpSpPr>
-      <p:grpSpPr>
-        <a:xfrm>
-          <a:off x="0" y="0"/>
-          <a:ext cx="0" cy="0"/>
-          <a:chOff x="0" y="0"/>
-          <a:chExt cx="0" cy="0"/>
-        </a:xfrm>
-      </p:grpSpPr>
-    </p:spTree>
-    <p:extLst>
-      <p:ext uri="{BB962C8B-B14F-4D97-AF65-F5344CB8AC3E}">
-        <p14:creationId xmlns:p14="http://schemas.microsoft.com/office/powerpoint/2010/main" val="332461270"/>
       </p:ext>
     </p:extLst>
   </p:cSld>
@@ -8111,90 +7988,6 @@
         </p:nvSpPr>
         <p:spPr>
           <a:xfrm>
-            <a:off x="2589212" y="712177"/>
-            <a:ext cx="8915400" cy="5199045"/>
-          </a:xfrm>
-        </p:spPr>
-        <p:txBody>
-          <a:bodyPr/>
-          <a:lstStyle/>
-          <a:p>
-            <a:r>
-              <a:rPr lang="en-US" dirty="0"/>
-              <a:t>Stake holders</a:t>
-            </a:r>
-          </a:p>
-          <a:p>
-            <a:endParaRPr lang="en-US" dirty="0"/>
-          </a:p>
-        </p:txBody>
-      </p:sp>
-      <p:pic>
-        <p:nvPicPr>
-          <p:cNvPr id="7" name="Picture 6"/>
-          <p:cNvPicPr>
-            <a:picLocks noChangeAspect="1"/>
-          </p:cNvPicPr>
-          <p:nvPr/>
-        </p:nvPicPr>
-        <p:blipFill>
-          <a:blip r:embed="rId2"/>
-          <a:stretch>
-            <a:fillRect/>
-          </a:stretch>
-        </p:blipFill>
-        <p:spPr>
-          <a:xfrm>
-            <a:off x="7308606" y="1406699"/>
-            <a:ext cx="3810000" cy="3810000"/>
-          </a:xfrm>
-          <a:prstGeom prst="rect">
-            <a:avLst/>
-          </a:prstGeom>
-        </p:spPr>
-      </p:pic>
-    </p:spTree>
-    <p:extLst>
-      <p:ext uri="{BB962C8B-B14F-4D97-AF65-F5344CB8AC3E}">
-        <p14:creationId xmlns:p14="http://schemas.microsoft.com/office/powerpoint/2010/main" val="1845618701"/>
-      </p:ext>
-    </p:extLst>
-  </p:cSld>
-  <p:clrMapOvr>
-    <a:masterClrMapping/>
-  </p:clrMapOvr>
-</p:sld>
-</file>
-
-<file path=ppt/slides/slide4.xml><?xml version="1.0" encoding="utf-8"?>
-<p:sld xmlns:a="http://schemas.openxmlformats.org/drawingml/2006/main" xmlns:r="http://schemas.openxmlformats.org/officeDocument/2006/relationships" xmlns:p="http://schemas.openxmlformats.org/presentationml/2006/main">
-  <p:cSld>
-    <p:spTree>
-      <p:nvGrpSpPr>
-        <p:cNvPr id="1" name=""/>
-        <p:cNvGrpSpPr/>
-        <p:nvPr/>
-      </p:nvGrpSpPr>
-      <p:grpSpPr>
-        <a:xfrm>
-          <a:off x="0" y="0"/>
-          <a:ext cx="0" cy="0"/>
-          <a:chOff x="0" y="0"/>
-          <a:chExt cx="0" cy="0"/>
-        </a:xfrm>
-      </p:grpSpPr>
-      <p:sp>
-        <p:nvSpPr>
-          <p:cNvPr id="3" name="Content Placeholder 2"/>
-          <p:cNvSpPr>
-            <a:spLocks noGrp="1"/>
-          </p:cNvSpPr>
-          <p:nvPr>
-            <p:ph idx="1"/>
-          </p:nvPr>
-        </p:nvSpPr>
-        <p:spPr>
-          <a:xfrm>
             <a:off x="2377177" y="490329"/>
             <a:ext cx="8915400" cy="5950227"/>
           </a:xfrm>
@@ -8274,7 +8067,7 @@
 </p:sld>
 </file>
 
-<file path=ppt/slides/slide5.xml><?xml version="1.0" encoding="utf-8"?>
+<file path=ppt/slides/slide4.xml><?xml version="1.0" encoding="utf-8"?>
 <p:sld xmlns:a="http://schemas.openxmlformats.org/drawingml/2006/main" xmlns:r="http://schemas.openxmlformats.org/officeDocument/2006/relationships" xmlns:p="http://schemas.openxmlformats.org/presentationml/2006/main">
   <p:cSld>
     <p:spTree>
@@ -8453,6 +8246,129 @@
 </p:sld>
 </file>
 
+<file path=ppt/slides/slide5.xml><?xml version="1.0" encoding="utf-8"?>
+<p:sld xmlns:a="http://schemas.openxmlformats.org/drawingml/2006/main" xmlns:r="http://schemas.openxmlformats.org/officeDocument/2006/relationships" xmlns:p="http://schemas.openxmlformats.org/presentationml/2006/main">
+  <p:cSld>
+    <p:spTree>
+      <p:nvGrpSpPr>
+        <p:cNvPr id="1" name=""/>
+        <p:cNvGrpSpPr/>
+        <p:nvPr/>
+      </p:nvGrpSpPr>
+      <p:grpSpPr>
+        <a:xfrm>
+          <a:off x="0" y="0"/>
+          <a:ext cx="0" cy="0"/>
+          <a:chOff x="0" y="0"/>
+          <a:chExt cx="0" cy="0"/>
+        </a:xfrm>
+      </p:grpSpPr>
+      <p:sp>
+        <p:nvSpPr>
+          <p:cNvPr id="3" name="Content Placeholder 2"/>
+          <p:cNvSpPr>
+            <a:spLocks noGrp="1"/>
+          </p:cNvSpPr>
+          <p:nvPr>
+            <p:ph idx="1"/>
+          </p:nvPr>
+        </p:nvSpPr>
+        <p:spPr>
+          <a:xfrm>
+            <a:off x="2377177" y="490329"/>
+            <a:ext cx="8915400" cy="5950227"/>
+          </a:xfrm>
+        </p:spPr>
+        <p:txBody>
+          <a:bodyPr>
+            <a:normAutofit/>
+          </a:bodyPr>
+          <a:lstStyle/>
+          <a:p>
+            <a:r>
+              <a:rPr lang="en-IN" sz="2800" dirty="0">
+                <a:latin typeface="Segoe UI" panose="020B0502040204020203" pitchFamily="34" charset="0"/>
+                <a:cs typeface="Segoe UI" panose="020B0502040204020203" pitchFamily="34" charset="0"/>
+              </a:rPr>
+              <a:t>Stakeholders</a:t>
+            </a:r>
+          </a:p>
+          <a:p>
+            <a:endParaRPr lang="en-IN" sz="2800" dirty="0"/>
+          </a:p>
+          <a:p>
+            <a:r>
+              <a:rPr lang="en-IN" sz="2800" dirty="0"/>
+              <a:t>2. </a:t>
+            </a:r>
+            <a:r>
+              <a:rPr lang="en-IN" sz="2400" dirty="0">
+                <a:latin typeface="Segoe UI" panose="020B0502040204020203" pitchFamily="34" charset="0"/>
+                <a:cs typeface="Segoe UI" panose="020B0502040204020203" pitchFamily="34" charset="0"/>
+              </a:rPr>
+              <a:t>Pharmacy Enterprise</a:t>
+            </a:r>
+          </a:p>
+          <a:p>
+            <a:endParaRPr lang="en-IN" sz="2400" dirty="0"/>
+          </a:p>
+          <a:p>
+            <a:r>
+              <a:rPr lang="en-US" dirty="0">
+                <a:latin typeface="Segoe UI" panose="020B0502040204020203" pitchFamily="34" charset="0"/>
+                <a:cs typeface="Segoe UI" panose="020B0502040204020203" pitchFamily="34" charset="0"/>
+              </a:rPr>
+              <a:t>Order opioids from pharma companies</a:t>
+            </a:r>
+            <a:endParaRPr lang="en-IN" dirty="0">
+              <a:latin typeface="Segoe UI" panose="020B0502040204020203" pitchFamily="34" charset="0"/>
+              <a:cs typeface="Segoe UI" panose="020B0502040204020203" pitchFamily="34" charset="0"/>
+            </a:endParaRPr>
+          </a:p>
+          <a:p>
+            <a:r>
+              <a:rPr lang="en-US" dirty="0">
+                <a:latin typeface="Segoe UI" panose="020B0502040204020203" pitchFamily="34" charset="0"/>
+                <a:cs typeface="Segoe UI" panose="020B0502040204020203" pitchFamily="34" charset="0"/>
+              </a:rPr>
+              <a:t>Sell opioids based on demand</a:t>
+            </a:r>
+            <a:endParaRPr lang="en-IN" dirty="0">
+              <a:latin typeface="Segoe UI" panose="020B0502040204020203" pitchFamily="34" charset="0"/>
+              <a:cs typeface="Segoe UI" panose="020B0502040204020203" pitchFamily="34" charset="0"/>
+            </a:endParaRPr>
+          </a:p>
+          <a:p>
+            <a:r>
+              <a:rPr lang="en-US" dirty="0">
+                <a:latin typeface="Segoe UI" panose="020B0502040204020203" pitchFamily="34" charset="0"/>
+                <a:cs typeface="Segoe UI" panose="020B0502040204020203" pitchFamily="34" charset="0"/>
+              </a:rPr>
+              <a:t>Keep a track of purchase history</a:t>
+            </a:r>
+            <a:endParaRPr lang="en-IN" dirty="0">
+              <a:latin typeface="Segoe UI" panose="020B0502040204020203" pitchFamily="34" charset="0"/>
+              <a:cs typeface="Segoe UI" panose="020B0502040204020203" pitchFamily="34" charset="0"/>
+            </a:endParaRPr>
+          </a:p>
+          <a:p>
+            <a:endParaRPr lang="en-IN" sz="2800" dirty="0"/>
+          </a:p>
+        </p:txBody>
+      </p:sp>
+    </p:spTree>
+    <p:extLst>
+      <p:ext uri="{BB962C8B-B14F-4D97-AF65-F5344CB8AC3E}">
+        <p14:creationId xmlns:p14="http://schemas.microsoft.com/office/powerpoint/2010/main" val="2994002200"/>
+      </p:ext>
+    </p:extLst>
+  </p:cSld>
+  <p:clrMapOvr>
+    <a:masterClrMapping/>
+  </p:clrMapOvr>
+</p:sld>
+</file>
+
 <file path=ppt/slides/slide6.xml><?xml version="1.0" encoding="utf-8"?>
 <p:sld xmlns:a="http://schemas.openxmlformats.org/drawingml/2006/main" xmlns:r="http://schemas.openxmlformats.org/officeDocument/2006/relationships" xmlns:p="http://schemas.openxmlformats.org/presentationml/2006/main">
   <p:cSld>
@@ -8506,17 +8422,20 @@
           <a:p>
             <a:r>
               <a:rPr lang="en-IN" sz="2800" dirty="0"/>
-              <a:t>2. </a:t>
+              <a:t>3. </a:t>
             </a:r>
             <a:r>
               <a:rPr lang="en-IN" sz="2400" dirty="0">
                 <a:latin typeface="Segoe UI" panose="020B0502040204020203" pitchFamily="34" charset="0"/>
                 <a:cs typeface="Segoe UI" panose="020B0502040204020203" pitchFamily="34" charset="0"/>
               </a:rPr>
-              <a:t>Pharmacy Enterprise</a:t>
-            </a:r>
-          </a:p>
-          <a:p>
+              <a:t>Pharmaceutical Company Enterprise</a:t>
+            </a:r>
+          </a:p>
+          <a:p>
+            <a:pPr marL="0" indent="0">
+              <a:buNone/>
+            </a:pPr>
             <a:endParaRPr lang="en-IN" sz="2400" dirty="0"/>
           </a:p>
           <a:p>
@@ -8525,7 +8444,7 @@
                 <a:latin typeface="Segoe UI" panose="020B0502040204020203" pitchFamily="34" charset="0"/>
                 <a:cs typeface="Segoe UI" panose="020B0502040204020203" pitchFamily="34" charset="0"/>
               </a:rPr>
-              <a:t>Order opioids from pharma companies</a:t>
+              <a:t>Supply opioids</a:t>
             </a:r>
             <a:endParaRPr lang="en-IN" dirty="0">
               <a:latin typeface="Segoe UI" panose="020B0502040204020203" pitchFamily="34" charset="0"/>
@@ -8538,7 +8457,7 @@
                 <a:latin typeface="Segoe UI" panose="020B0502040204020203" pitchFamily="34" charset="0"/>
                 <a:cs typeface="Segoe UI" panose="020B0502040204020203" pitchFamily="34" charset="0"/>
               </a:rPr>
-              <a:t>Sell opioids based on demand</a:t>
+              <a:t>Keep a track of opioids supplied across various organizations</a:t>
             </a:r>
             <a:endParaRPr lang="en-IN" dirty="0">
               <a:latin typeface="Segoe UI" panose="020B0502040204020203" pitchFamily="34" charset="0"/>
@@ -8546,19 +8465,6 @@
             </a:endParaRPr>
           </a:p>
           <a:p>
-            <a:r>
-              <a:rPr lang="en-US" dirty="0">
-                <a:latin typeface="Segoe UI" panose="020B0502040204020203" pitchFamily="34" charset="0"/>
-                <a:cs typeface="Segoe UI" panose="020B0502040204020203" pitchFamily="34" charset="0"/>
-              </a:rPr>
-              <a:t>Keep a track of purchase history</a:t>
-            </a:r>
-            <a:endParaRPr lang="en-IN" dirty="0">
-              <a:latin typeface="Segoe UI" panose="020B0502040204020203" pitchFamily="34" charset="0"/>
-              <a:cs typeface="Segoe UI" panose="020B0502040204020203" pitchFamily="34" charset="0"/>
-            </a:endParaRPr>
-          </a:p>
-          <a:p>
             <a:endParaRPr lang="en-IN" sz="2800" dirty="0"/>
           </a:p>
         </p:txBody>
@@ -8566,7 +8472,7 @@
     </p:spTree>
     <p:extLst>
       <p:ext uri="{BB962C8B-B14F-4D97-AF65-F5344CB8AC3E}">
-        <p14:creationId xmlns:p14="http://schemas.microsoft.com/office/powerpoint/2010/main" val="2994002200"/>
+        <p14:creationId xmlns:p14="http://schemas.microsoft.com/office/powerpoint/2010/main" val="1249275196"/>
       </p:ext>
     </p:extLst>
   </p:cSld>
@@ -8629,47 +8535,32 @@
           <a:p>
             <a:r>
               <a:rPr lang="en-IN" sz="2800" dirty="0"/>
-              <a:t>3. </a:t>
+              <a:t>4. </a:t>
             </a:r>
             <a:r>
               <a:rPr lang="en-IN" sz="2400" dirty="0">
                 <a:latin typeface="Segoe UI" panose="020B0502040204020203" pitchFamily="34" charset="0"/>
                 <a:cs typeface="Segoe UI" panose="020B0502040204020203" pitchFamily="34" charset="0"/>
               </a:rPr>
-              <a:t>Pharmaceutical Company Enterprise</a:t>
-            </a:r>
-          </a:p>
-          <a:p>
-            <a:pPr marL="0" indent="0">
-              <a:buNone/>
-            </a:pPr>
+              <a:t>Community Rehabilitation Enterprise</a:t>
+            </a:r>
+          </a:p>
+          <a:p>
             <a:endParaRPr lang="en-IN" sz="2400" dirty="0"/>
           </a:p>
           <a:p>
             <a:r>
-              <a:rPr lang="en-US" dirty="0">
-                <a:latin typeface="Segoe UI" panose="020B0502040204020203" pitchFamily="34" charset="0"/>
-                <a:cs typeface="Segoe UI" panose="020B0502040204020203" pitchFamily="34" charset="0"/>
-              </a:rPr>
-              <a:t>Supply opioids</a:t>
-            </a:r>
-            <a:endParaRPr lang="en-IN" dirty="0">
-              <a:latin typeface="Segoe UI" panose="020B0502040204020203" pitchFamily="34" charset="0"/>
-              <a:cs typeface="Segoe UI" panose="020B0502040204020203" pitchFamily="34" charset="0"/>
-            </a:endParaRPr>
-          </a:p>
-          <a:p>
-            <a:r>
-              <a:rPr lang="en-US" dirty="0">
-                <a:latin typeface="Segoe UI" panose="020B0502040204020203" pitchFamily="34" charset="0"/>
-                <a:cs typeface="Segoe UI" panose="020B0502040204020203" pitchFamily="34" charset="0"/>
-              </a:rPr>
-              <a:t>Keep a track of opioids supplied across various organizations</a:t>
-            </a:r>
-            <a:endParaRPr lang="en-IN" dirty="0">
-              <a:latin typeface="Segoe UI" panose="020B0502040204020203" pitchFamily="34" charset="0"/>
-              <a:cs typeface="Segoe UI" panose="020B0502040204020203" pitchFamily="34" charset="0"/>
-            </a:endParaRPr>
+              <a:rPr lang="en-US" dirty="0"/>
+              <a:t>Accept patients addicted to opioids</a:t>
+            </a:r>
+            <a:endParaRPr lang="en-IN" dirty="0"/>
+          </a:p>
+          <a:p>
+            <a:r>
+              <a:rPr lang="en-US" dirty="0"/>
+              <a:t>Collaborate with hospitals to fight crisis</a:t>
+            </a:r>
+            <a:endParaRPr lang="en-IN" dirty="0"/>
           </a:p>
           <a:p>
             <a:endParaRPr lang="en-IN" sz="2800" dirty="0"/>
@@ -8679,7 +8570,7 @@
     </p:spTree>
     <p:extLst>
       <p:ext uri="{BB962C8B-B14F-4D97-AF65-F5344CB8AC3E}">
-        <p14:creationId xmlns:p14="http://schemas.microsoft.com/office/powerpoint/2010/main" val="1249275196"/>
+        <p14:creationId xmlns:p14="http://schemas.microsoft.com/office/powerpoint/2010/main" val="3362439739"/>
       </p:ext>
     </p:extLst>
   </p:cSld>
@@ -8742,14 +8633,14 @@
           <a:p>
             <a:r>
               <a:rPr lang="en-IN" sz="2800" dirty="0"/>
-              <a:t>4. </a:t>
+              <a:t>5. </a:t>
             </a:r>
             <a:r>
               <a:rPr lang="en-IN" sz="2400" dirty="0">
                 <a:latin typeface="Segoe UI" panose="020B0502040204020203" pitchFamily="34" charset="0"/>
                 <a:cs typeface="Segoe UI" panose="020B0502040204020203" pitchFamily="34" charset="0"/>
               </a:rPr>
-              <a:t>Community Rehabilitation Enterprise</a:t>
+              <a:t>Criminal Justice Department</a:t>
             </a:r>
           </a:p>
           <a:p>
@@ -8758,14 +8649,14 @@
           <a:p>
             <a:r>
               <a:rPr lang="en-US" dirty="0"/>
-              <a:t>Accept patients addicted to opioids</a:t>
+              <a:t>Find pharmacies who are selling the opioids illegally </a:t>
             </a:r>
             <a:endParaRPr lang="en-IN" dirty="0"/>
           </a:p>
           <a:p>
             <a:r>
               <a:rPr lang="en-US" dirty="0"/>
-              <a:t>Collaborate with hospitals to fight crisis</a:t>
+              <a:t>Find doctors who prescribe opioids despite medical history of abuse</a:t>
             </a:r>
             <a:endParaRPr lang="en-IN" dirty="0"/>
           </a:p>
@@ -8777,7 +8668,7 @@
     </p:spTree>
     <p:extLst>
       <p:ext uri="{BB962C8B-B14F-4D97-AF65-F5344CB8AC3E}">
-        <p14:creationId xmlns:p14="http://schemas.microsoft.com/office/powerpoint/2010/main" val="3362439739"/>
+        <p14:creationId xmlns:p14="http://schemas.microsoft.com/office/powerpoint/2010/main" val="3973559264"/>
       </p:ext>
     </p:extLst>
   </p:cSld>
@@ -8847,7 +8738,7 @@
                 <a:latin typeface="Segoe UI" panose="020B0502040204020203" pitchFamily="34" charset="0"/>
                 <a:cs typeface="Segoe UI" panose="020B0502040204020203" pitchFamily="34" charset="0"/>
               </a:rPr>
-              <a:t>Criminal Justice Department</a:t>
+              <a:t>Public Health Organization (Ecosystem)</a:t>
             </a:r>
           </a:p>
           <a:p>
@@ -8856,14 +8747,7 @@
           <a:p>
             <a:r>
               <a:rPr lang="en-US" dirty="0"/>
-              <a:t>Find pharmacies who are selling the opioids illegally </a:t>
-            </a:r>
-            <a:endParaRPr lang="en-IN" dirty="0"/>
-          </a:p>
-          <a:p>
-            <a:r>
-              <a:rPr lang="en-US" dirty="0"/>
-              <a:t>Find doctors who prescribe opioids despite medical history of abuse</a:t>
+              <a:t>Collaborate with other organizations to find patients who are abusing opioids</a:t>
             </a:r>
             <a:endParaRPr lang="en-IN" dirty="0"/>
           </a:p>
@@ -8875,7 +8759,7 @@
     </p:spTree>
     <p:extLst>
       <p:ext uri="{BB962C8B-B14F-4D97-AF65-F5344CB8AC3E}">
-        <p14:creationId xmlns:p14="http://schemas.microsoft.com/office/powerpoint/2010/main" val="3973559264"/>
+        <p14:creationId xmlns:p14="http://schemas.microsoft.com/office/powerpoint/2010/main" val="4038624650"/>
       </p:ext>
     </p:extLst>
   </p:cSld>

</xml_diff>